<commit_message>
updated rmd to include Data Explorer output, fisher's exact test, and html markdown
</commit_message>
<xml_diff>
--- a/CAH - Client Pitch.pptx
+++ b/CAH - Client Pitch.pptx
@@ -223,9 +223,6 @@
               </a:rPr>
               <a:t>otentially recouping a median employer mat</a:t>
             </a:r>
-            <a:endParaRPr lang="en-US" sz="1400" dirty="0">
-              <a:latin typeface="Franklin Gothic Book" panose="020B0503020102020204" pitchFamily="34" charset="0"/>
-            </a:endParaRPr>
           </a:p>
         </c:rich>
       </c:tx>
@@ -16481,7 +16478,7 @@
           <a:p>
             <a:fld id="{1EBEDD12-BCD5-485B-BCBC-34BB01D7923C}" type="datetimeFigureOut">
               <a:rPr lang="en-US" smtClean="0"/>
-              <a:t>6/30/2025</a:t>
+              <a:t>7/2/2025</a:t>
             </a:fld>
             <a:endParaRPr lang="en-US" dirty="0"/>
           </a:p>
@@ -16695,7 +16692,7 @@
           <a:p>
             <a:fld id="{6EE7A52F-9D89-7442-A8E9-48D1527B5F6B}" type="datetimeFigureOut">
               <a:rPr lang="en-US" smtClean="0"/>
-              <a:t>6/30/2025</a:t>
+              <a:t>7/2/2025</a:t>
             </a:fld>
             <a:endParaRPr lang="en-US" dirty="0"/>
           </a:p>
@@ -26424,7 +26421,10 @@
           <a:bodyPr/>
           <a:lstStyle/>
           <a:p>
-            <a:endParaRPr lang="en-US"/>
+            <a:r>
+              <a:rPr lang="en-US" dirty="0"/>
+              <a:t>References</a:t>
+            </a:r>
           </a:p>
         </p:txBody>
       </p:sp>
@@ -28887,35 +28887,6 @@
 </file>
 
 <file path=customXml/item1.xml><?xml version="1.0" encoding="utf-8"?>
-<p:properties xmlns:p="http://schemas.microsoft.com/office/2006/metadata/properties" xmlns:xsi="http://www.w3.org/2001/XMLSchema-instance" xmlns:pc="http://schemas.microsoft.com/office/infopath/2007/PartnerControls">
-  <documentManagement>
-    <Background xmlns="71af3243-3dd4-4a8d-8c0d-dd76da1f02a5">false</Background>
-    <Status xmlns="71af3243-3dd4-4a8d-8c0d-dd76da1f02a5">Not started</Status>
-    <_ip_UnifiedCompliancePolicyUIAction xmlns="http://schemas.microsoft.com/sharepoint/v3" xsi:nil="true"/>
-    <Image xmlns="71af3243-3dd4-4a8d-8c0d-dd76da1f02a5">
-      <Url xsi:nil="true"/>
-      <Description xsi:nil="true"/>
-    </Image>
-    <_ip_UnifiedCompliancePolicyProperties xmlns="http://schemas.microsoft.com/sharepoint/v3" xsi:nil="true"/>
-    <ImageTagsTaxHTField xmlns="71af3243-3dd4-4a8d-8c0d-dd76da1f02a5">
-      <Terms xmlns="http://schemas.microsoft.com/office/infopath/2007/PartnerControls"/>
-    </ImageTagsTaxHTField>
-    <TaxCatchAll xmlns="230e9df3-be65-4c73-a93b-d1236ebd677e" xsi:nil="true"/>
-    <MediaServiceKeyPoints xmlns="71af3243-3dd4-4a8d-8c0d-dd76da1f02a5" xsi:nil="true"/>
-  </documentManagement>
-</p:properties>
-</file>
-
-<file path=customXml/item2.xml><?xml version="1.0" encoding="utf-8"?>
-<?mso-contentType ?>
-<FormTemplates xmlns="http://schemas.microsoft.com/sharepoint/v3/contenttype/forms">
-  <Display>DocumentLibraryForm</Display>
-  <Edit>DocumentLibraryForm</Edit>
-  <New>DocumentLibraryForm</New>
-</FormTemplates>
-</file>
-
-<file path=customXml/item3.xml><?xml version="1.0" encoding="utf-8"?>
 <ct:contentTypeSchema xmlns:ct="http://schemas.microsoft.com/office/2006/metadata/contentType" xmlns:ma="http://schemas.microsoft.com/office/2006/metadata/properties/metaAttributes" ct:_="" ma:_="" ma:contentTypeName="Document" ma:contentTypeID="0x01010079F111ED35F8CC479449609E8A0923A6" ma:contentTypeVersion="28" ma:contentTypeDescription="Create a new document." ma:contentTypeScope="" ma:versionID="60f5a4f2d2b0abadcf532d48ebf9cb71">
   <xsd:schema xmlns:xsd="http://www.w3.org/2001/XMLSchema" xmlns:xs="http://www.w3.org/2001/XMLSchema" xmlns:p="http://schemas.microsoft.com/office/2006/metadata/properties" xmlns:ns1="http://schemas.microsoft.com/sharepoint/v3" xmlns:ns2="71af3243-3dd4-4a8d-8c0d-dd76da1f02a5" xmlns:ns3="16c05727-aa75-4e4a-9b5f-8a80a1165891" xmlns:ns4="230e9df3-be65-4c73-a93b-d1236ebd677e" targetNamespace="http://schemas.microsoft.com/office/2006/metadata/properties" ma:root="true" ma:fieldsID="7dd78129e6a1811f84807ad11c651531" ns1:_="" ns2:_="" ns3:_="" ns4:_="">
     <xsd:import namespace="http://schemas.microsoft.com/sharepoint/v3"/>
@@ -29227,27 +29198,36 @@
 </ct:contentTypeSchema>
 </file>
 
-<file path=customXml/itemProps1.xml><?xml version="1.0" encoding="utf-8"?>
-<ds:datastoreItem xmlns:ds="http://schemas.openxmlformats.org/officeDocument/2006/customXml" ds:itemID="{4F4B194E-8B30-4377-8C59-ECFB902D2A26}">
-  <ds:schemaRefs>
-    <ds:schemaRef ds:uri="http://schemas.microsoft.com/office/2006/metadata/properties"/>
-    <ds:schemaRef ds:uri="http://schemas.microsoft.com/office/infopath/2007/PartnerControls"/>
-    <ds:schemaRef ds:uri="71af3243-3dd4-4a8d-8c0d-dd76da1f02a5"/>
-    <ds:schemaRef ds:uri="http://schemas.microsoft.com/sharepoint/v3"/>
-    <ds:schemaRef ds:uri="230e9df3-be65-4c73-a93b-d1236ebd677e"/>
-  </ds:schemaRefs>
-</ds:datastoreItem>
+<file path=customXml/item2.xml><?xml version="1.0" encoding="utf-8"?>
+<?mso-contentType ?>
+<FormTemplates xmlns="http://schemas.microsoft.com/sharepoint/v3/contenttype/forms">
+  <Display>DocumentLibraryForm</Display>
+  <Edit>DocumentLibraryForm</Edit>
+  <New>DocumentLibraryForm</New>
+</FormTemplates>
 </file>
 
-<file path=customXml/itemProps2.xml><?xml version="1.0" encoding="utf-8"?>
-<ds:datastoreItem xmlns:ds="http://schemas.openxmlformats.org/officeDocument/2006/customXml" ds:itemID="{C21FFAC0-05A2-416A-B06C-C248395482CF}">
-  <ds:schemaRefs>
-    <ds:schemaRef ds:uri="http://schemas.microsoft.com/sharepoint/v3/contenttype/forms"/>
-  </ds:schemaRefs>
-</ds:datastoreItem>
+<file path=customXml/item3.xml><?xml version="1.0" encoding="utf-8"?>
+<p:properties xmlns:p="http://schemas.microsoft.com/office/2006/metadata/properties" xmlns:xsi="http://www.w3.org/2001/XMLSchema-instance" xmlns:pc="http://schemas.microsoft.com/office/infopath/2007/PartnerControls">
+  <documentManagement>
+    <Background xmlns="71af3243-3dd4-4a8d-8c0d-dd76da1f02a5">false</Background>
+    <Status xmlns="71af3243-3dd4-4a8d-8c0d-dd76da1f02a5">Not started</Status>
+    <_ip_UnifiedCompliancePolicyUIAction xmlns="http://schemas.microsoft.com/sharepoint/v3" xsi:nil="true"/>
+    <Image xmlns="71af3243-3dd4-4a8d-8c0d-dd76da1f02a5">
+      <Url xsi:nil="true"/>
+      <Description xsi:nil="true"/>
+    </Image>
+    <_ip_UnifiedCompliancePolicyProperties xmlns="http://schemas.microsoft.com/sharepoint/v3" xsi:nil="true"/>
+    <ImageTagsTaxHTField xmlns="71af3243-3dd4-4a8d-8c0d-dd76da1f02a5">
+      <Terms xmlns="http://schemas.microsoft.com/office/infopath/2007/PartnerControls"/>
+    </ImageTagsTaxHTField>
+    <TaxCatchAll xmlns="230e9df3-be65-4c73-a93b-d1236ebd677e" xsi:nil="true"/>
+    <MediaServiceKeyPoints xmlns="71af3243-3dd4-4a8d-8c0d-dd76da1f02a5" xsi:nil="true"/>
+  </documentManagement>
+</p:properties>
 </file>
 
-<file path=customXml/itemProps3.xml><?xml version="1.0" encoding="utf-8"?>
+<file path=customXml/itemProps1.xml><?xml version="1.0" encoding="utf-8"?>
 <ds:datastoreItem xmlns:ds="http://schemas.openxmlformats.org/officeDocument/2006/customXml" ds:itemID="{92DB9E12-8AC3-4138-BF4D-720A5525AB10}">
   <ds:schemaRefs>
     <ds:schemaRef ds:uri="http://schemas.microsoft.com/office/2006/metadata/contentType"/>
@@ -29268,6 +29248,26 @@
 </ds:datastoreItem>
 </file>
 
+<file path=customXml/itemProps2.xml><?xml version="1.0" encoding="utf-8"?>
+<ds:datastoreItem xmlns:ds="http://schemas.openxmlformats.org/officeDocument/2006/customXml" ds:itemID="{C21FFAC0-05A2-416A-B06C-C248395482CF}">
+  <ds:schemaRefs>
+    <ds:schemaRef ds:uri="http://schemas.microsoft.com/sharepoint/v3/contenttype/forms"/>
+  </ds:schemaRefs>
+</ds:datastoreItem>
+</file>
+
+<file path=customXml/itemProps3.xml><?xml version="1.0" encoding="utf-8"?>
+<ds:datastoreItem xmlns:ds="http://schemas.openxmlformats.org/officeDocument/2006/customXml" ds:itemID="{4F4B194E-8B30-4377-8C59-ECFB902D2A26}">
+  <ds:schemaRefs>
+    <ds:schemaRef ds:uri="http://schemas.microsoft.com/office/2006/metadata/properties"/>
+    <ds:schemaRef ds:uri="http://schemas.microsoft.com/office/infopath/2007/PartnerControls"/>
+    <ds:schemaRef ds:uri="71af3243-3dd4-4a8d-8c0d-dd76da1f02a5"/>
+    <ds:schemaRef ds:uri="http://schemas.microsoft.com/sharepoint/v3"/>
+    <ds:schemaRef ds:uri="230e9df3-be65-4c73-a93b-d1236ebd677e"/>
+  </ds:schemaRefs>
+</ds:datastoreItem>
+</file>
+
 <file path=docMetadata/LabelInfo.xml><?xml version="1.0" encoding="utf-8"?>
 <clbl:labelList xmlns:clbl="http://schemas.microsoft.com/office/2020/mipLabelMetadata"/>
 </file>
</xml_diff>

<commit_message>
created and saved plots in rmd
</commit_message>
<xml_diff>
--- a/CAH - Client Pitch.pptx
+++ b/CAH - Client Pitch.pptx
@@ -16478,7 +16478,7 @@
           <a:p>
             <a:fld id="{1EBEDD12-BCD5-485B-BCBC-34BB01D7923C}" type="datetimeFigureOut">
               <a:rPr lang="en-US" smtClean="0"/>
-              <a:t>7/2/2025</a:t>
+              <a:t>7/7/2025</a:t>
             </a:fld>
             <a:endParaRPr lang="en-US" dirty="0"/>
           </a:p>
@@ -16692,7 +16692,7 @@
           <a:p>
             <a:fld id="{6EE7A52F-9D89-7442-A8E9-48D1527B5F6B}" type="datetimeFigureOut">
               <a:rPr lang="en-US" smtClean="0"/>
-              <a:t>7/2/2025</a:t>
+              <a:t>7/7/2025</a:t>
             </a:fld>
             <a:endParaRPr lang="en-US" dirty="0"/>
           </a:p>
@@ -17886,6 +17886,90 @@
 </file>
 
 <file path=ppt/notesSlides/notesSlide7.xml><?xml version="1.0" encoding="utf-8"?>
+<p:notes xmlns:a="http://schemas.openxmlformats.org/drawingml/2006/main" xmlns:r="http://schemas.openxmlformats.org/officeDocument/2006/relationships" xmlns:p="http://schemas.openxmlformats.org/presentationml/2006/main">
+  <p:cSld>
+    <p:spTree>
+      <p:nvGrpSpPr>
+        <p:cNvPr id="1" name=""/>
+        <p:cNvGrpSpPr/>
+        <p:nvPr/>
+      </p:nvGrpSpPr>
+      <p:grpSpPr>
+        <a:xfrm>
+          <a:off x="0" y="0"/>
+          <a:ext cx="0" cy="0"/>
+          <a:chOff x="0" y="0"/>
+          <a:chExt cx="0" cy="0"/>
+        </a:xfrm>
+      </p:grpSpPr>
+      <p:sp>
+        <p:nvSpPr>
+          <p:cNvPr id="2" name="Slide Image Placeholder 1"/>
+          <p:cNvSpPr>
+            <a:spLocks noGrp="1" noRot="1" noChangeAspect="1"/>
+          </p:cNvSpPr>
+          <p:nvPr>
+            <p:ph type="sldImg"/>
+          </p:nvPr>
+        </p:nvSpPr>
+        <p:spPr/>
+      </p:sp>
+      <p:sp>
+        <p:nvSpPr>
+          <p:cNvPr id="3" name="Notes Placeholder 2"/>
+          <p:cNvSpPr>
+            <a:spLocks noGrp="1"/>
+          </p:cNvSpPr>
+          <p:nvPr>
+            <p:ph type="body" idx="1"/>
+          </p:nvPr>
+        </p:nvSpPr>
+        <p:spPr/>
+        <p:txBody>
+          <a:bodyPr/>
+          <a:lstStyle/>
+          <a:p>
+            <a:endParaRPr lang="en-US" dirty="0"/>
+          </a:p>
+        </p:txBody>
+      </p:sp>
+      <p:sp>
+        <p:nvSpPr>
+          <p:cNvPr id="4" name="Slide Number Placeholder 3"/>
+          <p:cNvSpPr>
+            <a:spLocks noGrp="1"/>
+          </p:cNvSpPr>
+          <p:nvPr>
+            <p:ph type="sldNum" sz="quarter" idx="5"/>
+          </p:nvPr>
+        </p:nvSpPr>
+        <p:spPr/>
+        <p:txBody>
+          <a:bodyPr/>
+          <a:lstStyle/>
+          <a:p>
+            <a:fld id="{A89C7E07-3C67-C64C-8DA0-0404F6303970}" type="slidenum">
+              <a:rPr lang="en-US" smtClean="0"/>
+              <a:t>8</a:t>
+            </a:fld>
+            <a:endParaRPr lang="en-US" dirty="0"/>
+          </a:p>
+        </p:txBody>
+      </p:sp>
+    </p:spTree>
+    <p:extLst>
+      <p:ext uri="{BB962C8B-B14F-4D97-AF65-F5344CB8AC3E}">
+        <p14:creationId xmlns:p14="http://schemas.microsoft.com/office/powerpoint/2010/main" val="1544402448"/>
+      </p:ext>
+    </p:extLst>
+  </p:cSld>
+  <p:clrMapOvr>
+    <a:masterClrMapping/>
+  </p:clrMapOvr>
+</p:notes>
+</file>
+
+<file path=ppt/notesSlides/notesSlide8.xml><?xml version="1.0" encoding="utf-8"?>
 <p:notes xmlns:a="http://schemas.openxmlformats.org/drawingml/2006/main" xmlns:r="http://schemas.openxmlformats.org/officeDocument/2006/relationships" xmlns:p="http://schemas.openxmlformats.org/presentationml/2006/main">
   <p:cSld>
     <p:spTree>
@@ -26467,8 +26551,8 @@
         </p:nvSpPr>
         <p:spPr>
           <a:xfrm>
-            <a:off x="3048000" y="2832149"/>
-            <a:ext cx="6096000" cy="5078313"/>
+            <a:off x="594360" y="2832149"/>
+            <a:ext cx="10972800" cy="3416320"/>
           </a:xfrm>
           <a:prstGeom prst="rect">
             <a:avLst/>
@@ -26573,8 +26657,17 @@
                 <a:solidFill>
                   <a:schemeClr val="bg1"/>
                 </a:solidFill>
+                <a:hlinkClick r:id="rId6"/>
               </a:rPr>
               <a:t>https://www.pew.org/en/research-and-analysis/issue-briefs/2017/06/employer-barriers-to-and-motivations-for-offering-retirement-benefits</a:t>
+            </a:r>
+            <a:r>
+              <a:rPr lang="en-US" dirty="0">
+                <a:solidFill>
+                  <a:schemeClr val="bg1"/>
+                </a:solidFill>
+              </a:rPr>
+              <a:t> </a:t>
             </a:r>
           </a:p>
           <a:p>
@@ -28887,6 +28980,35 @@
 </file>
 
 <file path=customXml/item1.xml><?xml version="1.0" encoding="utf-8"?>
+<p:properties xmlns:p="http://schemas.microsoft.com/office/2006/metadata/properties" xmlns:xsi="http://www.w3.org/2001/XMLSchema-instance" xmlns:pc="http://schemas.microsoft.com/office/infopath/2007/PartnerControls">
+  <documentManagement>
+    <Background xmlns="71af3243-3dd4-4a8d-8c0d-dd76da1f02a5">false</Background>
+    <Status xmlns="71af3243-3dd4-4a8d-8c0d-dd76da1f02a5">Not started</Status>
+    <_ip_UnifiedCompliancePolicyUIAction xmlns="http://schemas.microsoft.com/sharepoint/v3" xsi:nil="true"/>
+    <Image xmlns="71af3243-3dd4-4a8d-8c0d-dd76da1f02a5">
+      <Url xsi:nil="true"/>
+      <Description xsi:nil="true"/>
+    </Image>
+    <_ip_UnifiedCompliancePolicyProperties xmlns="http://schemas.microsoft.com/sharepoint/v3" xsi:nil="true"/>
+    <ImageTagsTaxHTField xmlns="71af3243-3dd4-4a8d-8c0d-dd76da1f02a5">
+      <Terms xmlns="http://schemas.microsoft.com/office/infopath/2007/PartnerControls"/>
+    </ImageTagsTaxHTField>
+    <TaxCatchAll xmlns="230e9df3-be65-4c73-a93b-d1236ebd677e" xsi:nil="true"/>
+    <MediaServiceKeyPoints xmlns="71af3243-3dd4-4a8d-8c0d-dd76da1f02a5" xsi:nil="true"/>
+  </documentManagement>
+</p:properties>
+</file>
+
+<file path=customXml/item2.xml><?xml version="1.0" encoding="utf-8"?>
+<?mso-contentType ?>
+<FormTemplates xmlns="http://schemas.microsoft.com/sharepoint/v3/contenttype/forms">
+  <Display>DocumentLibraryForm</Display>
+  <Edit>DocumentLibraryForm</Edit>
+  <New>DocumentLibraryForm</New>
+</FormTemplates>
+</file>
+
+<file path=customXml/item3.xml><?xml version="1.0" encoding="utf-8"?>
 <ct:contentTypeSchema xmlns:ct="http://schemas.microsoft.com/office/2006/metadata/contentType" xmlns:ma="http://schemas.microsoft.com/office/2006/metadata/properties/metaAttributes" ct:_="" ma:_="" ma:contentTypeName="Document" ma:contentTypeID="0x01010079F111ED35F8CC479449609E8A0923A6" ma:contentTypeVersion="28" ma:contentTypeDescription="Create a new document." ma:contentTypeScope="" ma:versionID="60f5a4f2d2b0abadcf532d48ebf9cb71">
   <xsd:schema xmlns:xsd="http://www.w3.org/2001/XMLSchema" xmlns:xs="http://www.w3.org/2001/XMLSchema" xmlns:p="http://schemas.microsoft.com/office/2006/metadata/properties" xmlns:ns1="http://schemas.microsoft.com/sharepoint/v3" xmlns:ns2="71af3243-3dd4-4a8d-8c0d-dd76da1f02a5" xmlns:ns3="16c05727-aa75-4e4a-9b5f-8a80a1165891" xmlns:ns4="230e9df3-be65-4c73-a93b-d1236ebd677e" targetNamespace="http://schemas.microsoft.com/office/2006/metadata/properties" ma:root="true" ma:fieldsID="7dd78129e6a1811f84807ad11c651531" ns1:_="" ns2:_="" ns3:_="" ns4:_="">
     <xsd:import namespace="http://schemas.microsoft.com/sharepoint/v3"/>
@@ -29198,36 +29320,27 @@
 </ct:contentTypeSchema>
 </file>
 
-<file path=customXml/item2.xml><?xml version="1.0" encoding="utf-8"?>
-<?mso-contentType ?>
-<FormTemplates xmlns="http://schemas.microsoft.com/sharepoint/v3/contenttype/forms">
-  <Display>DocumentLibraryForm</Display>
-  <Edit>DocumentLibraryForm</Edit>
-  <New>DocumentLibraryForm</New>
-</FormTemplates>
+<file path=customXml/itemProps1.xml><?xml version="1.0" encoding="utf-8"?>
+<ds:datastoreItem xmlns:ds="http://schemas.openxmlformats.org/officeDocument/2006/customXml" ds:itemID="{4F4B194E-8B30-4377-8C59-ECFB902D2A26}">
+  <ds:schemaRefs>
+    <ds:schemaRef ds:uri="http://schemas.microsoft.com/office/2006/metadata/properties"/>
+    <ds:schemaRef ds:uri="http://schemas.microsoft.com/office/infopath/2007/PartnerControls"/>
+    <ds:schemaRef ds:uri="71af3243-3dd4-4a8d-8c0d-dd76da1f02a5"/>
+    <ds:schemaRef ds:uri="http://schemas.microsoft.com/sharepoint/v3"/>
+    <ds:schemaRef ds:uri="230e9df3-be65-4c73-a93b-d1236ebd677e"/>
+  </ds:schemaRefs>
+</ds:datastoreItem>
 </file>
 
-<file path=customXml/item3.xml><?xml version="1.0" encoding="utf-8"?>
-<p:properties xmlns:p="http://schemas.microsoft.com/office/2006/metadata/properties" xmlns:xsi="http://www.w3.org/2001/XMLSchema-instance" xmlns:pc="http://schemas.microsoft.com/office/infopath/2007/PartnerControls">
-  <documentManagement>
-    <Background xmlns="71af3243-3dd4-4a8d-8c0d-dd76da1f02a5">false</Background>
-    <Status xmlns="71af3243-3dd4-4a8d-8c0d-dd76da1f02a5">Not started</Status>
-    <_ip_UnifiedCompliancePolicyUIAction xmlns="http://schemas.microsoft.com/sharepoint/v3" xsi:nil="true"/>
-    <Image xmlns="71af3243-3dd4-4a8d-8c0d-dd76da1f02a5">
-      <Url xsi:nil="true"/>
-      <Description xsi:nil="true"/>
-    </Image>
-    <_ip_UnifiedCompliancePolicyProperties xmlns="http://schemas.microsoft.com/sharepoint/v3" xsi:nil="true"/>
-    <ImageTagsTaxHTField xmlns="71af3243-3dd4-4a8d-8c0d-dd76da1f02a5">
-      <Terms xmlns="http://schemas.microsoft.com/office/infopath/2007/PartnerControls"/>
-    </ImageTagsTaxHTField>
-    <TaxCatchAll xmlns="230e9df3-be65-4c73-a93b-d1236ebd677e" xsi:nil="true"/>
-    <MediaServiceKeyPoints xmlns="71af3243-3dd4-4a8d-8c0d-dd76da1f02a5" xsi:nil="true"/>
-  </documentManagement>
-</p:properties>
+<file path=customXml/itemProps2.xml><?xml version="1.0" encoding="utf-8"?>
+<ds:datastoreItem xmlns:ds="http://schemas.openxmlformats.org/officeDocument/2006/customXml" ds:itemID="{C21FFAC0-05A2-416A-B06C-C248395482CF}">
+  <ds:schemaRefs>
+    <ds:schemaRef ds:uri="http://schemas.microsoft.com/sharepoint/v3/contenttype/forms"/>
+  </ds:schemaRefs>
+</ds:datastoreItem>
 </file>
 
-<file path=customXml/itemProps1.xml><?xml version="1.0" encoding="utf-8"?>
+<file path=customXml/itemProps3.xml><?xml version="1.0" encoding="utf-8"?>
 <ds:datastoreItem xmlns:ds="http://schemas.openxmlformats.org/officeDocument/2006/customXml" ds:itemID="{92DB9E12-8AC3-4138-BF4D-720A5525AB10}">
   <ds:schemaRefs>
     <ds:schemaRef ds:uri="http://schemas.microsoft.com/office/2006/metadata/contentType"/>
@@ -29248,26 +29361,6 @@
 </ds:datastoreItem>
 </file>
 
-<file path=customXml/itemProps2.xml><?xml version="1.0" encoding="utf-8"?>
-<ds:datastoreItem xmlns:ds="http://schemas.openxmlformats.org/officeDocument/2006/customXml" ds:itemID="{C21FFAC0-05A2-416A-B06C-C248395482CF}">
-  <ds:schemaRefs>
-    <ds:schemaRef ds:uri="http://schemas.microsoft.com/sharepoint/v3/contenttype/forms"/>
-  </ds:schemaRefs>
-</ds:datastoreItem>
-</file>
-
-<file path=customXml/itemProps3.xml><?xml version="1.0" encoding="utf-8"?>
-<ds:datastoreItem xmlns:ds="http://schemas.openxmlformats.org/officeDocument/2006/customXml" ds:itemID="{4F4B194E-8B30-4377-8C59-ECFB902D2A26}">
-  <ds:schemaRefs>
-    <ds:schemaRef ds:uri="http://schemas.microsoft.com/office/2006/metadata/properties"/>
-    <ds:schemaRef ds:uri="http://schemas.microsoft.com/office/infopath/2007/PartnerControls"/>
-    <ds:schemaRef ds:uri="71af3243-3dd4-4a8d-8c0d-dd76da1f02a5"/>
-    <ds:schemaRef ds:uri="http://schemas.microsoft.com/sharepoint/v3"/>
-    <ds:schemaRef ds:uri="230e9df3-be65-4c73-a93b-d1236ebd677e"/>
-  </ds:schemaRefs>
-</ds:datastoreItem>
-</file>
-
 <file path=docMetadata/LabelInfo.xml><?xml version="1.0" encoding="utf-8"?>
 <clbl:labelList xmlns:clbl="http://schemas.microsoft.com/office/2020/mipLabelMetadata"/>
 </file>
</xml_diff>